<commit_message>
mad the menu items display with a capital letter
</commit_message>
<xml_diff>
--- a/Demo/Demo3.pptx
+++ b/Demo/Demo3.pptx
@@ -6003,32 +6003,10 @@
                 <a:ea typeface="Arial Unicode MS" pitchFamily="34" charset="-128"/>
                 <a:cs typeface="Arial Unicode MS" pitchFamily="34" charset="-128"/>
               </a:rPr>
-              <a:t>appears </a:t>
-            </a:r>
-            <a:r>
-              <a:rPr lang="en-US" sz="2900" smtClean="0">
-                <a:ln>
-                  <a:solidFill>
-                    <a:schemeClr val="bg1">
-                      <a:lumMod val="75000"/>
-                      <a:lumOff val="25000"/>
-                    </a:schemeClr>
-                  </a:solidFill>
-                </a:ln>
-                <a:solidFill>
-                  <a:schemeClr val="bg1">
-                    <a:lumMod val="75000"/>
-                    <a:lumOff val="25000"/>
-                  </a:schemeClr>
-                </a:solidFill>
-                <a:latin typeface="Arial Unicode MS" pitchFamily="34" charset="-128"/>
-                <a:ea typeface="Arial Unicode MS" pitchFamily="34" charset="-128"/>
-                <a:cs typeface="Arial Unicode MS" pitchFamily="34" charset="-128"/>
-              </a:rPr>
-              <a:t>on </a:t>
-            </a:r>
-            <a:r>
-              <a:rPr lang="en-US" sz="2900" smtClean="0">
+              <a:t>appears on </a:t>
+            </a:r>
+            <a:r>
+              <a:rPr lang="en-US" sz="2900" dirty="0" smtClean="0">
                 <a:ln>
                   <a:solidFill>
                     <a:schemeClr val="bg1">
@@ -6683,6 +6661,50 @@
               <a:t>	</a:t>
             </a:r>
             <a:r>
+              <a:rPr lang="en-US" sz="3600" smtClean="0">
+                <a:ln>
+                  <a:solidFill>
+                    <a:schemeClr val="bg1">
+                      <a:lumMod val="75000"/>
+                      <a:lumOff val="25000"/>
+                    </a:schemeClr>
+                  </a:solidFill>
+                </a:ln>
+                <a:solidFill>
+                  <a:schemeClr val="bg1">
+                    <a:lumMod val="75000"/>
+                    <a:lumOff val="25000"/>
+                  </a:schemeClr>
+                </a:solidFill>
+                <a:latin typeface="Arial Unicode MS" pitchFamily="34" charset="-128"/>
+                <a:ea typeface="Arial Unicode MS" pitchFamily="34" charset="-128"/>
+                <a:cs typeface="Arial Unicode MS" pitchFamily="34" charset="-128"/>
+              </a:rPr>
+              <a:t>- </a:t>
+            </a:r>
+            <a:r>
+              <a:rPr lang="en-US" sz="3600" smtClean="0">
+                <a:ln>
+                  <a:solidFill>
+                    <a:schemeClr val="bg1">
+                      <a:lumMod val="75000"/>
+                      <a:lumOff val="25000"/>
+                    </a:schemeClr>
+                  </a:solidFill>
+                </a:ln>
+                <a:solidFill>
+                  <a:schemeClr val="bg1">
+                    <a:lumMod val="75000"/>
+                    <a:lumOff val="25000"/>
+                  </a:schemeClr>
+                </a:solidFill>
+                <a:latin typeface="Arial Unicode MS" pitchFamily="34" charset="-128"/>
+                <a:ea typeface="Arial Unicode MS" pitchFamily="34" charset="-128"/>
+                <a:cs typeface="Arial Unicode MS" pitchFamily="34" charset="-128"/>
+              </a:rPr>
+              <a:t>Gather </a:t>
+            </a:r>
+            <a:r>
               <a:rPr lang="en-US" sz="3600" dirty="0" smtClean="0">
                 <a:ln>
                   <a:solidFill>
@@ -6702,7 +6724,7 @@
                 <a:ea typeface="Arial Unicode MS" pitchFamily="34" charset="-128"/>
                 <a:cs typeface="Arial Unicode MS" pitchFamily="34" charset="-128"/>
               </a:rPr>
-              <a:t>- Gathering user and system history</a:t>
+              <a:t>user and system history</a:t>
             </a:r>
           </a:p>
           <a:p>

</xml_diff>

<commit_message>
Added new ending slide ;-)
</commit_message>
<xml_diff>
--- a/Demo/Demo3.pptx
+++ b/Demo/Demo3.pptx
@@ -115,7 +115,7 @@
   </p:defaultTextStyle>
   <p:extLst>
     <p:ext uri="{EFAFB233-063F-42B5-8137-9DF3F51BA10A}">
-      <p15:sldGuideLst xmlns:p15="http://schemas.microsoft.com/office/powerpoint/2012/main">
+      <p15:sldGuideLst xmlns:p15="http://schemas.microsoft.com/office/powerpoint/2012/main" xmlns="">
         <p15:guide id="1" orient="horz" pos="2160">
           <p15:clr>
             <a:srgbClr val="A4A3A4"/>
@@ -422,7 +422,8 @@
           <a:p>
             <a:fld id="{7F015566-082B-418D-AA60-C795F4B71E65}" type="datetimeFigureOut">
               <a:rPr lang="en-ZA" smtClean="0"/>
-              <a:t>2015-08-21</a:t>
+              <a:pPr/>
+              <a:t>2015/08/21</a:t>
             </a:fld>
             <a:endParaRPr lang="en-ZA"/>
           </a:p>
@@ -445,6 +446,7 @@
           <a:p>
             <a:fld id="{49E72126-7F2A-47C9-BFC3-034C5306EB33}" type="slidenum">
               <a:rPr lang="en-ZA" smtClean="0"/>
+              <a:pPr/>
               <a:t>‹#›</a:t>
             </a:fld>
             <a:endParaRPr lang="en-ZA"/>
@@ -587,7 +589,8 @@
           <a:p>
             <a:fld id="{7F015566-082B-418D-AA60-C795F4B71E65}" type="datetimeFigureOut">
               <a:rPr lang="en-ZA" smtClean="0"/>
-              <a:t>2015-08-21</a:t>
+              <a:pPr/>
+              <a:t>2015/08/21</a:t>
             </a:fld>
             <a:endParaRPr lang="en-ZA"/>
           </a:p>
@@ -629,6 +632,7 @@
           <a:p>
             <a:fld id="{49E72126-7F2A-47C9-BFC3-034C5306EB33}" type="slidenum">
               <a:rPr lang="en-ZA" smtClean="0"/>
+              <a:pPr/>
               <a:t>‹#›</a:t>
             </a:fld>
             <a:endParaRPr lang="en-ZA"/>
@@ -762,7 +766,8 @@
           <a:p>
             <a:fld id="{7F015566-082B-418D-AA60-C795F4B71E65}" type="datetimeFigureOut">
               <a:rPr lang="en-ZA" smtClean="0"/>
-              <a:t>2015-08-21</a:t>
+              <a:pPr/>
+              <a:t>2015/08/21</a:t>
             </a:fld>
             <a:endParaRPr lang="en-ZA"/>
           </a:p>
@@ -804,6 +809,7 @@
           <a:p>
             <a:fld id="{49E72126-7F2A-47C9-BFC3-034C5306EB33}" type="slidenum">
               <a:rPr lang="en-ZA" smtClean="0"/>
+              <a:pPr/>
               <a:t>‹#›</a:t>
             </a:fld>
             <a:endParaRPr lang="en-ZA"/>
@@ -909,7 +915,8 @@
           <a:p>
             <a:fld id="{7F015566-082B-418D-AA60-C795F4B71E65}" type="datetimeFigureOut">
               <a:rPr lang="en-ZA" smtClean="0"/>
-              <a:t>2015-08-21</a:t>
+              <a:pPr/>
+              <a:t>2015/08/21</a:t>
             </a:fld>
             <a:endParaRPr lang="en-ZA"/>
           </a:p>
@@ -936,6 +943,7 @@
           <a:p>
             <a:fld id="{49E72126-7F2A-47C9-BFC3-034C5306EB33}" type="slidenum">
               <a:rPr lang="en-ZA" smtClean="0"/>
+              <a:pPr/>
               <a:t>‹#›</a:t>
             </a:fld>
             <a:endParaRPr lang="en-ZA"/>
@@ -1026,7 +1034,8 @@
           <a:p>
             <a:fld id="{7F015566-082B-418D-AA60-C795F4B71E65}" type="datetimeFigureOut">
               <a:rPr lang="en-ZA" smtClean="0"/>
-              <a:t>2015-08-21</a:t>
+              <a:pPr/>
+              <a:t>2015/08/21</a:t>
             </a:fld>
             <a:endParaRPr lang="en-ZA"/>
           </a:p>
@@ -1068,6 +1077,7 @@
           <a:p>
             <a:fld id="{49E72126-7F2A-47C9-BFC3-034C5306EB33}" type="slidenum">
               <a:rPr lang="en-ZA" smtClean="0"/>
+              <a:pPr/>
               <a:t>‹#›</a:t>
             </a:fld>
             <a:endParaRPr lang="en-ZA"/>
@@ -1296,7 +1306,8 @@
           <a:p>
             <a:fld id="{7F015566-082B-418D-AA60-C795F4B71E65}" type="datetimeFigureOut">
               <a:rPr lang="en-ZA" smtClean="0"/>
-              <a:t>2015-08-21</a:t>
+              <a:pPr/>
+              <a:t>2015/08/21</a:t>
             </a:fld>
             <a:endParaRPr lang="en-ZA"/>
           </a:p>
@@ -1338,6 +1349,7 @@
           <a:p>
             <a:fld id="{49E72126-7F2A-47C9-BFC3-034C5306EB33}" type="slidenum">
               <a:rPr lang="en-ZA" smtClean="0"/>
+              <a:pPr/>
               <a:t>‹#›</a:t>
             </a:fld>
             <a:endParaRPr lang="en-ZA"/>
@@ -1523,6 +1535,7 @@
           <a:p>
             <a:fld id="{49E72126-7F2A-47C9-BFC3-034C5306EB33}" type="slidenum">
               <a:rPr lang="en-ZA" smtClean="0"/>
+              <a:pPr/>
               <a:t>‹#›</a:t>
             </a:fld>
             <a:endParaRPr lang="en-ZA"/>
@@ -1565,7 +1578,8 @@
           <a:p>
             <a:fld id="{7F015566-082B-418D-AA60-C795F4B71E65}" type="datetimeFigureOut">
               <a:rPr lang="en-ZA" smtClean="0"/>
-              <a:t>2015-08-21</a:t>
+              <a:pPr/>
+              <a:t>2015/08/21</a:t>
             </a:fld>
             <a:endParaRPr lang="en-ZA"/>
           </a:p>
@@ -2012,7 +2026,8 @@
           <a:p>
             <a:fld id="{7F015566-082B-418D-AA60-C795F4B71E65}" type="datetimeFigureOut">
               <a:rPr lang="en-ZA" smtClean="0"/>
-              <a:t>2015-08-21</a:t>
+              <a:pPr/>
+              <a:t>2015/08/21</a:t>
             </a:fld>
             <a:endParaRPr lang="en-ZA"/>
           </a:p>
@@ -2054,6 +2069,7 @@
           <a:p>
             <a:fld id="{49E72126-7F2A-47C9-BFC3-034C5306EB33}" type="slidenum">
               <a:rPr lang="en-ZA" smtClean="0"/>
+              <a:pPr/>
               <a:t>‹#›</a:t>
             </a:fld>
             <a:endParaRPr lang="en-ZA"/>
@@ -2125,7 +2141,8 @@
           <a:p>
             <a:fld id="{7F015566-082B-418D-AA60-C795F4B71E65}" type="datetimeFigureOut">
               <a:rPr lang="en-ZA" smtClean="0"/>
-              <a:t>2015-08-21</a:t>
+              <a:pPr/>
+              <a:t>2015/08/21</a:t>
             </a:fld>
             <a:endParaRPr lang="en-ZA"/>
           </a:p>
@@ -2167,6 +2184,7 @@
           <a:p>
             <a:fld id="{49E72126-7F2A-47C9-BFC3-034C5306EB33}" type="slidenum">
               <a:rPr lang="en-ZA" smtClean="0"/>
+              <a:pPr/>
               <a:t>‹#›</a:t>
             </a:fld>
             <a:endParaRPr lang="en-ZA"/>
@@ -2375,7 +2393,8 @@
           <a:p>
             <a:fld id="{7F015566-082B-418D-AA60-C795F4B71E65}" type="datetimeFigureOut">
               <a:rPr lang="en-ZA" smtClean="0"/>
-              <a:t>2015-08-21</a:t>
+              <a:pPr/>
+              <a:t>2015/08/21</a:t>
             </a:fld>
             <a:endParaRPr lang="en-ZA"/>
           </a:p>
@@ -2398,6 +2417,7 @@
           <a:p>
             <a:fld id="{49E72126-7F2A-47C9-BFC3-034C5306EB33}" type="slidenum">
               <a:rPr lang="en-ZA" smtClean="0"/>
+              <a:pPr/>
               <a:t>‹#›</a:t>
             </a:fld>
             <a:endParaRPr lang="en-ZA"/>
@@ -2615,7 +2635,8 @@
           <a:p>
             <a:fld id="{7F015566-082B-418D-AA60-C795F4B71E65}" type="datetimeFigureOut">
               <a:rPr lang="en-ZA" smtClean="0"/>
-              <a:t>2015-08-21</a:t>
+              <a:pPr/>
+              <a:t>2015/08/21</a:t>
             </a:fld>
             <a:endParaRPr lang="en-ZA"/>
           </a:p>
@@ -2638,6 +2659,7 @@
           <a:p>
             <a:fld id="{49E72126-7F2A-47C9-BFC3-034C5306EB33}" type="slidenum">
               <a:rPr lang="en-ZA" smtClean="0"/>
+              <a:pPr/>
               <a:t>‹#›</a:t>
             </a:fld>
             <a:endParaRPr lang="en-ZA"/>
@@ -2788,7 +2810,8 @@
           <a:p>
             <a:fld id="{7F015566-082B-418D-AA60-C795F4B71E65}" type="datetimeFigureOut">
               <a:rPr lang="en-ZA" smtClean="0"/>
-              <a:t>2015-08-21</a:t>
+              <a:pPr/>
+              <a:t>2015/08/21</a:t>
             </a:fld>
             <a:endParaRPr lang="en-ZA"/>
           </a:p>
@@ -2865,6 +2888,7 @@
           <a:p>
             <a:fld id="{49E72126-7F2A-47C9-BFC3-034C5306EB33}" type="slidenum">
               <a:rPr lang="en-ZA" smtClean="0"/>
+              <a:pPr/>
               <a:t>‹#›</a:t>
             </a:fld>
             <a:endParaRPr lang="en-ZA"/>
@@ -3621,7 +3645,7 @@
       </p:sp>
       <p:pic>
         <p:nvPicPr>
-          <p:cNvPr id="7170" name="Picture 2" descr="http://2.bp.blogspot.com/-YOpwxFArNdY/VDsexOZeoOI/AAAAAAAAAjk/wcGEvJQVqag/s1600/persons-0016_large.png"/>
+          <p:cNvPr id="5" name="Picture 2" descr="https://kendallwilson3.files.wordpress.com/2014/11/slider-baby-excited-940x420.jpg"/>
           <p:cNvPicPr>
             <a:picLocks noChangeAspect="1" noChangeArrowheads="1"/>
           </p:cNvPicPr>
@@ -3636,8 +3660,8 @@
         </p:blipFill>
         <p:spPr bwMode="auto">
           <a:xfrm>
-            <a:off x="2555776" y="2452835"/>
-            <a:ext cx="4000500" cy="4000501"/>
+            <a:off x="664790" y="2636912"/>
+            <a:ext cx="7867650" cy="3514726"/>
           </a:xfrm>
           <a:prstGeom prst="rect">
             <a:avLst/>
@@ -3844,25 +3868,6 @@
               </a:rPr>
               <a:t>~ Enhancements </a:t>
             </a:r>
-            <a:endParaRPr lang="en-US" sz="3300" dirty="0" smtClean="0">
-              <a:ln>
-                <a:solidFill>
-                  <a:schemeClr val="bg1">
-                    <a:lumMod val="75000"/>
-                    <a:lumOff val="25000"/>
-                  </a:schemeClr>
-                </a:solidFill>
-              </a:ln>
-              <a:solidFill>
-                <a:schemeClr val="bg1">
-                  <a:lumMod val="75000"/>
-                  <a:lumOff val="25000"/>
-                </a:schemeClr>
-              </a:solidFill>
-              <a:latin typeface="Arial Unicode MS" pitchFamily="34" charset="-128"/>
-              <a:ea typeface="Arial Unicode MS" pitchFamily="34" charset="-128"/>
-              <a:cs typeface="Arial Unicode MS" pitchFamily="34" charset="-128"/>
-            </a:endParaRPr>
           </a:p>
           <a:p>
             <a:r>
@@ -3885,29 +3890,7 @@
                 <a:ea typeface="Arial Unicode MS" pitchFamily="34" charset="-128"/>
                 <a:cs typeface="Arial Unicode MS" pitchFamily="34" charset="-128"/>
               </a:rPr>
-              <a:t>~ </a:t>
-            </a:r>
-            <a:r>
-              <a:rPr lang="en-US" sz="3300" dirty="0" smtClean="0">
-                <a:ln>
-                  <a:solidFill>
-                    <a:schemeClr val="bg1">
-                      <a:lumMod val="75000"/>
-                      <a:lumOff val="25000"/>
-                    </a:schemeClr>
-                  </a:solidFill>
-                </a:ln>
-                <a:solidFill>
-                  <a:schemeClr val="bg1">
-                    <a:lumMod val="75000"/>
-                    <a:lumOff val="25000"/>
-                  </a:schemeClr>
-                </a:solidFill>
-                <a:latin typeface="Arial Unicode MS" pitchFamily="34" charset="-128"/>
-                <a:ea typeface="Arial Unicode MS" pitchFamily="34" charset="-128"/>
-                <a:cs typeface="Arial Unicode MS" pitchFamily="34" charset="-128"/>
-              </a:rPr>
-              <a:t>Next sprints</a:t>
+              <a:t>~ Next sprints</a:t>
             </a:r>
           </a:p>
           <a:p>
@@ -4198,8 +4181,10 @@
                 <a:ea typeface="Arial Unicode MS" pitchFamily="34" charset="-128"/>
                 <a:cs typeface="Arial Unicode MS" pitchFamily="34" charset="-128"/>
               </a:rPr>
-              <a:t>~ </a:t>
-            </a:r>
+              <a:t>~ Agile - scrum method</a:t>
+            </a:r>
+          </a:p>
+          <a:p>
             <a:r>
               <a:rPr lang="en-US" sz="3300" dirty="0" smtClean="0">
                 <a:ln>
@@ -4220,97 +4205,7 @@
                 <a:ea typeface="Arial Unicode MS" pitchFamily="34" charset="-128"/>
                 <a:cs typeface="Arial Unicode MS" pitchFamily="34" charset="-128"/>
               </a:rPr>
-              <a:t>Agile - </a:t>
-            </a:r>
-            <a:r>
-              <a:rPr lang="en-US" sz="3300" dirty="0" smtClean="0">
-                <a:ln>
-                  <a:solidFill>
-                    <a:schemeClr val="bg1">
-                      <a:lumMod val="75000"/>
-                      <a:lumOff val="25000"/>
-                    </a:schemeClr>
-                  </a:solidFill>
-                </a:ln>
-                <a:solidFill>
-                  <a:schemeClr val="bg1">
-                    <a:lumMod val="75000"/>
-                    <a:lumOff val="25000"/>
-                  </a:schemeClr>
-                </a:solidFill>
-                <a:latin typeface="Arial Unicode MS" pitchFamily="34" charset="-128"/>
-                <a:ea typeface="Arial Unicode MS" pitchFamily="34" charset="-128"/>
-                <a:cs typeface="Arial Unicode MS" pitchFamily="34" charset="-128"/>
-              </a:rPr>
-              <a:t>scrum method</a:t>
-            </a:r>
-          </a:p>
-          <a:p>
-            <a:r>
-              <a:rPr lang="en-US" sz="3300" dirty="0" smtClean="0">
-                <a:ln>
-                  <a:solidFill>
-                    <a:schemeClr val="bg1">
-                      <a:lumMod val="75000"/>
-                      <a:lumOff val="25000"/>
-                    </a:schemeClr>
-                  </a:solidFill>
-                </a:ln>
-                <a:solidFill>
-                  <a:schemeClr val="bg1">
-                    <a:lumMod val="75000"/>
-                    <a:lumOff val="25000"/>
-                  </a:schemeClr>
-                </a:solidFill>
-                <a:latin typeface="Arial Unicode MS" pitchFamily="34" charset="-128"/>
-                <a:ea typeface="Arial Unicode MS" pitchFamily="34" charset="-128"/>
-                <a:cs typeface="Arial Unicode MS" pitchFamily="34" charset="-128"/>
-              </a:rPr>
-              <a:t>~ Sprints </a:t>
-            </a:r>
-            <a:r>
-              <a:rPr lang="en-US" sz="3300" dirty="0" smtClean="0">
-                <a:ln>
-                  <a:solidFill>
-                    <a:schemeClr val="bg1">
-                      <a:lumMod val="75000"/>
-                      <a:lumOff val="25000"/>
-                    </a:schemeClr>
-                  </a:solidFill>
-                </a:ln>
-                <a:solidFill>
-                  <a:schemeClr val="bg1">
-                    <a:lumMod val="75000"/>
-                    <a:lumOff val="25000"/>
-                  </a:schemeClr>
-                </a:solidFill>
-                <a:latin typeface="Arial Unicode MS" pitchFamily="34" charset="-128"/>
-                <a:ea typeface="Arial Unicode MS" pitchFamily="34" charset="-128"/>
-                <a:cs typeface="Arial Unicode MS" pitchFamily="34" charset="-128"/>
-              </a:rPr>
-              <a:t>- </a:t>
-            </a:r>
-            <a:r>
-              <a:rPr lang="en-US" sz="3300" dirty="0" smtClean="0">
-                <a:ln>
-                  <a:solidFill>
-                    <a:schemeClr val="bg1">
-                      <a:lumMod val="75000"/>
-                      <a:lumOff val="25000"/>
-                    </a:schemeClr>
-                  </a:solidFill>
-                </a:ln>
-                <a:solidFill>
-                  <a:schemeClr val="bg1">
-                    <a:lumMod val="75000"/>
-                    <a:lumOff val="25000"/>
-                  </a:schemeClr>
-                </a:solidFill>
-                <a:latin typeface="Arial Unicode MS" pitchFamily="34" charset="-128"/>
-                <a:ea typeface="Arial Unicode MS" pitchFamily="34" charset="-128"/>
-                <a:cs typeface="Arial Unicode MS" pitchFamily="34" charset="-128"/>
-              </a:rPr>
-              <a:t>7 phases (4/7 complete)</a:t>
+              <a:t>~ Sprints - 7 phases (4/7 complete)</a:t>
             </a:r>
           </a:p>
           <a:p>
@@ -4693,51 +4588,7 @@
                 <a:ea typeface="Arial Unicode MS" pitchFamily="34" charset="-128"/>
                 <a:cs typeface="Arial Unicode MS" pitchFamily="34" charset="-128"/>
               </a:rPr>
-              <a:t>~ Unit </a:t>
-            </a:r>
-            <a:r>
-              <a:rPr lang="en-US" sz="3200" dirty="0" smtClean="0">
-                <a:ln>
-                  <a:solidFill>
-                    <a:schemeClr val="bg1">
-                      <a:lumMod val="75000"/>
-                      <a:lumOff val="25000"/>
-                    </a:schemeClr>
-                  </a:solidFill>
-                </a:ln>
-                <a:solidFill>
-                  <a:schemeClr val="bg1">
-                    <a:lumMod val="75000"/>
-                    <a:lumOff val="25000"/>
-                  </a:schemeClr>
-                </a:solidFill>
-                <a:latin typeface="Arial Unicode MS" pitchFamily="34" charset="-128"/>
-                <a:ea typeface="Arial Unicode MS" pitchFamily="34" charset="-128"/>
-                <a:cs typeface="Arial Unicode MS" pitchFamily="34" charset="-128"/>
-              </a:rPr>
-              <a:t>testing </a:t>
-            </a:r>
-            <a:r>
-              <a:rPr lang="en-US" sz="3200" dirty="0" smtClean="0">
-                <a:ln>
-                  <a:solidFill>
-                    <a:schemeClr val="bg1">
-                      <a:lumMod val="75000"/>
-                      <a:lumOff val="25000"/>
-                    </a:schemeClr>
-                  </a:solidFill>
-                </a:ln>
-                <a:solidFill>
-                  <a:schemeClr val="bg1">
-                    <a:lumMod val="75000"/>
-                    <a:lumOff val="25000"/>
-                  </a:schemeClr>
-                </a:solidFill>
-                <a:latin typeface="Arial Unicode MS" pitchFamily="34" charset="-128"/>
-                <a:ea typeface="Arial Unicode MS" pitchFamily="34" charset="-128"/>
-                <a:cs typeface="Arial Unicode MS" pitchFamily="34" charset="-128"/>
-              </a:rPr>
-              <a:t>and showed unit testing for</a:t>
+              <a:t>~ Unit testing and showed unit testing for</a:t>
             </a:r>
           </a:p>
           <a:p>
@@ -5141,117 +4992,7 @@
                 <a:ea typeface="Arial Unicode MS" pitchFamily="34" charset="-128"/>
                 <a:cs typeface="Arial Unicode MS" pitchFamily="34" charset="-128"/>
               </a:rPr>
-              <a:t>- </a:t>
-            </a:r>
-            <a:r>
-              <a:rPr lang="en-US" sz="3300" dirty="0" smtClean="0">
-                <a:ln>
-                  <a:solidFill>
-                    <a:schemeClr val="bg1">
-                      <a:lumMod val="75000"/>
-                      <a:lumOff val="25000"/>
-                    </a:schemeClr>
-                  </a:solidFill>
-                </a:ln>
-                <a:solidFill>
-                  <a:schemeClr val="bg1">
-                    <a:lumMod val="75000"/>
-                    <a:lumOff val="25000"/>
-                  </a:schemeClr>
-                </a:solidFill>
-                <a:latin typeface="Arial Unicode MS" pitchFamily="34" charset="-128"/>
-                <a:ea typeface="Arial Unicode MS" pitchFamily="34" charset="-128"/>
-                <a:cs typeface="Arial Unicode MS" pitchFamily="34" charset="-128"/>
-              </a:rPr>
-              <a:t>When </a:t>
-            </a:r>
-            <a:r>
-              <a:rPr lang="en-US" sz="3300" dirty="0" smtClean="0">
-                <a:ln>
-                  <a:solidFill>
-                    <a:schemeClr val="bg1">
-                      <a:lumMod val="75000"/>
-                      <a:lumOff val="25000"/>
-                    </a:schemeClr>
-                  </a:solidFill>
-                </a:ln>
-                <a:solidFill>
-                  <a:schemeClr val="bg1">
-                    <a:lumMod val="75000"/>
-                    <a:lumOff val="25000"/>
-                  </a:schemeClr>
-                </a:solidFill>
-                <a:latin typeface="Arial Unicode MS" pitchFamily="34" charset="-128"/>
-                <a:ea typeface="Arial Unicode MS" pitchFamily="34" charset="-128"/>
-                <a:cs typeface="Arial Unicode MS" pitchFamily="34" charset="-128"/>
-              </a:rPr>
-              <a:t>an order is </a:t>
-            </a:r>
-            <a:r>
-              <a:rPr lang="en-US" sz="3300" dirty="0" smtClean="0">
-                <a:ln>
-                  <a:solidFill>
-                    <a:schemeClr val="bg1">
-                      <a:lumMod val="75000"/>
-                      <a:lumOff val="25000"/>
-                    </a:schemeClr>
-                  </a:solidFill>
-                </a:ln>
-                <a:solidFill>
-                  <a:schemeClr val="bg1">
-                    <a:lumMod val="75000"/>
-                    <a:lumOff val="25000"/>
-                  </a:schemeClr>
-                </a:solidFill>
-                <a:latin typeface="Arial Unicode MS" pitchFamily="34" charset="-128"/>
-                <a:ea typeface="Arial Unicode MS" pitchFamily="34" charset="-128"/>
-                <a:cs typeface="Arial Unicode MS" pitchFamily="34" charset="-128"/>
-              </a:rPr>
-              <a:t>ready, the cashier 	   will mark </a:t>
-            </a:r>
-            <a:r>
-              <a:rPr lang="en-US" sz="3300" dirty="0" smtClean="0">
-                <a:ln>
-                  <a:solidFill>
-                    <a:schemeClr val="bg1">
-                      <a:lumMod val="75000"/>
-                      <a:lumOff val="25000"/>
-                    </a:schemeClr>
-                  </a:solidFill>
-                </a:ln>
-                <a:solidFill>
-                  <a:schemeClr val="bg1">
-                    <a:lumMod val="75000"/>
-                    <a:lumOff val="25000"/>
-                  </a:schemeClr>
-                </a:solidFill>
-                <a:latin typeface="Arial Unicode MS" pitchFamily="34" charset="-128"/>
-                <a:ea typeface="Arial Unicode MS" pitchFamily="34" charset="-128"/>
-                <a:cs typeface="Arial Unicode MS" pitchFamily="34" charset="-128"/>
-              </a:rPr>
-              <a:t>it as done and trigger an </a:t>
-            </a:r>
-            <a:r>
-              <a:rPr lang="en-US" sz="3300" dirty="0" smtClean="0">
-                <a:ln>
-                  <a:solidFill>
-                    <a:schemeClr val="bg1">
-                      <a:lumMod val="75000"/>
-                      <a:lumOff val="25000"/>
-                    </a:schemeClr>
-                  </a:solidFill>
-                </a:ln>
-                <a:solidFill>
-                  <a:schemeClr val="bg1">
-                    <a:lumMod val="75000"/>
-                    <a:lumOff val="25000"/>
-                  </a:schemeClr>
-                </a:solidFill>
-                <a:latin typeface="Arial Unicode MS" pitchFamily="34" charset="-128"/>
-                <a:ea typeface="Arial Unicode MS" pitchFamily="34" charset="-128"/>
-                <a:cs typeface="Arial Unicode MS" pitchFamily="34" charset="-128"/>
-              </a:rPr>
-              <a:t>e-	   mail notification.</a:t>
+              <a:t>- When an order is ready, the cashier 	   will mark it as done and trigger an e-	   mail notification.</a:t>
             </a:r>
             <a:r>
               <a:rPr lang="en-US" sz="3300" dirty="0">
@@ -5384,7 +5125,31 @@
                 <a:ea typeface="Arial Unicode MS" pitchFamily="34" charset="-128"/>
                 <a:cs typeface="Arial Unicode MS" pitchFamily="34" charset="-128"/>
               </a:rPr>
-              <a:t>   it deducted from their </a:t>
+              <a:t>   it deducted from their salary.</a:t>
+            </a:r>
+          </a:p>
+          <a:p>
+            <a:r>
+              <a:rPr lang="en-US" sz="3300" dirty="0">
+                <a:ln>
+                  <a:solidFill>
+                    <a:schemeClr val="bg1">
+                      <a:lumMod val="75000"/>
+                      <a:lumOff val="25000"/>
+                    </a:schemeClr>
+                  </a:solidFill>
+                </a:ln>
+                <a:solidFill>
+                  <a:schemeClr val="bg1">
+                    <a:lumMod val="75000"/>
+                    <a:lumOff val="25000"/>
+                  </a:schemeClr>
+                </a:solidFill>
+                <a:latin typeface="Arial Unicode MS" pitchFamily="34" charset="-128"/>
+                <a:ea typeface="Arial Unicode MS" pitchFamily="34" charset="-128"/>
+                <a:cs typeface="Arial Unicode MS" pitchFamily="34" charset="-128"/>
+              </a:rPr>
+              <a:t>	</a:t>
             </a:r>
             <a:r>
               <a:rPr lang="en-US" sz="3300" dirty="0" smtClean="0">
@@ -5406,94 +5171,7 @@
                 <a:ea typeface="Arial Unicode MS" pitchFamily="34" charset="-128"/>
                 <a:cs typeface="Arial Unicode MS" pitchFamily="34" charset="-128"/>
               </a:rPr>
-              <a:t>salary.</a:t>
-            </a:r>
-            <a:endParaRPr lang="en-US" sz="3300" dirty="0" smtClean="0">
-              <a:ln>
-                <a:solidFill>
-                  <a:schemeClr val="bg1">
-                    <a:lumMod val="75000"/>
-                    <a:lumOff val="25000"/>
-                  </a:schemeClr>
-                </a:solidFill>
-              </a:ln>
-              <a:solidFill>
-                <a:schemeClr val="bg1">
-                  <a:lumMod val="75000"/>
-                  <a:lumOff val="25000"/>
-                </a:schemeClr>
-              </a:solidFill>
-              <a:latin typeface="Arial Unicode MS" pitchFamily="34" charset="-128"/>
-              <a:ea typeface="Arial Unicode MS" pitchFamily="34" charset="-128"/>
-              <a:cs typeface="Arial Unicode MS" pitchFamily="34" charset="-128"/>
-            </a:endParaRPr>
-          </a:p>
-          <a:p>
-            <a:r>
-              <a:rPr lang="en-US" sz="3300" dirty="0">
-                <a:ln>
-                  <a:solidFill>
-                    <a:schemeClr val="bg1">
-                      <a:lumMod val="75000"/>
-                      <a:lumOff val="25000"/>
-                    </a:schemeClr>
-                  </a:solidFill>
-                </a:ln>
-                <a:solidFill>
-                  <a:schemeClr val="bg1">
-                    <a:lumMod val="75000"/>
-                    <a:lumOff val="25000"/>
-                  </a:schemeClr>
-                </a:solidFill>
-                <a:latin typeface="Arial Unicode MS" pitchFamily="34" charset="-128"/>
-                <a:ea typeface="Arial Unicode MS" pitchFamily="34" charset="-128"/>
-                <a:cs typeface="Arial Unicode MS" pitchFamily="34" charset="-128"/>
-              </a:rPr>
-              <a:t>	</a:t>
-            </a:r>
-            <a:r>
-              <a:rPr lang="en-US" sz="3300" dirty="0" smtClean="0">
-                <a:ln>
-                  <a:solidFill>
-                    <a:schemeClr val="bg1">
-                      <a:lumMod val="75000"/>
-                      <a:lumOff val="25000"/>
-                    </a:schemeClr>
-                  </a:solidFill>
-                </a:ln>
-                <a:solidFill>
-                  <a:schemeClr val="bg1">
-                    <a:lumMod val="75000"/>
-                    <a:lumOff val="25000"/>
-                  </a:schemeClr>
-                </a:solidFill>
-                <a:latin typeface="Arial Unicode MS" pitchFamily="34" charset="-128"/>
-                <a:ea typeface="Arial Unicode MS" pitchFamily="34" charset="-128"/>
-                <a:cs typeface="Arial Unicode MS" pitchFamily="34" charset="-128"/>
-              </a:rPr>
-              <a:t>- Documentation </a:t>
-            </a:r>
-            <a:r>
-              <a:rPr lang="en-US" sz="3300" dirty="0" smtClean="0">
-                <a:ln>
-                  <a:solidFill>
-                    <a:schemeClr val="bg1">
-                      <a:lumMod val="75000"/>
-                      <a:lumOff val="25000"/>
-                    </a:schemeClr>
-                  </a:solidFill>
-                </a:ln>
-                <a:solidFill>
-                  <a:schemeClr val="bg1">
-                    <a:lumMod val="75000"/>
-                    <a:lumOff val="25000"/>
-                  </a:schemeClr>
-                </a:solidFill>
-                <a:latin typeface="Arial Unicode MS" pitchFamily="34" charset="-128"/>
-                <a:ea typeface="Arial Unicode MS" pitchFamily="34" charset="-128"/>
-                <a:cs typeface="Arial Unicode MS" pitchFamily="34" charset="-128"/>
-              </a:rPr>
-              <a:t>updated.</a:t>
+              <a:t>- Documentation updated.</a:t>
             </a:r>
             <a:r>
               <a:rPr lang="en-ZA" sz="3600" dirty="0"/>
@@ -5739,7 +5417,31 @@
                 <a:ea typeface="Arial Unicode MS" pitchFamily="34" charset="-128"/>
                 <a:cs typeface="Arial Unicode MS" pitchFamily="34" charset="-128"/>
               </a:rPr>
-              <a:t>~ Working on a dynamic </a:t>
+              <a:t>~ Working on a dynamic menu category bar with </a:t>
+            </a:r>
+          </a:p>
+          <a:p>
+            <a:r>
+              <a:rPr lang="en-US" sz="2900" dirty="0">
+                <a:ln>
+                  <a:solidFill>
+                    <a:schemeClr val="bg1">
+                      <a:lumMod val="75000"/>
+                      <a:lumOff val="25000"/>
+                    </a:schemeClr>
+                  </a:solidFill>
+                </a:ln>
+                <a:solidFill>
+                  <a:schemeClr val="bg1">
+                    <a:lumMod val="75000"/>
+                    <a:lumOff val="25000"/>
+                  </a:schemeClr>
+                </a:solidFill>
+                <a:latin typeface="Arial Unicode MS" pitchFamily="34" charset="-128"/>
+                <a:ea typeface="Arial Unicode MS" pitchFamily="34" charset="-128"/>
+                <a:cs typeface="Arial Unicode MS" pitchFamily="34" charset="-128"/>
+              </a:rPr>
+              <a:t> </a:t>
             </a:r>
             <a:r>
               <a:rPr lang="en-US" sz="2900" dirty="0" smtClean="0">
@@ -5761,8 +5463,10 @@
                 <a:ea typeface="Arial Unicode MS" pitchFamily="34" charset="-128"/>
                 <a:cs typeface="Arial Unicode MS" pitchFamily="34" charset="-128"/>
               </a:rPr>
-              <a:t>menu </a:t>
-            </a:r>
+              <a:t>  dynamic pages</a:t>
+            </a:r>
+          </a:p>
+          <a:p>
             <a:r>
               <a:rPr lang="en-US" sz="2900" dirty="0" smtClean="0">
                 <a:ln>
@@ -5783,10 +5487,80 @@
                 <a:ea typeface="Arial Unicode MS" pitchFamily="34" charset="-128"/>
                 <a:cs typeface="Arial Unicode MS" pitchFamily="34" charset="-128"/>
               </a:rPr>
-              <a:t>category bar with </a:t>
-            </a:r>
-          </a:p>
-          <a:p>
+              <a:t>~ Users can add preferences to orders</a:t>
+            </a:r>
+          </a:p>
+          <a:p>
+            <a:r>
+              <a:rPr lang="en-US" sz="2900" dirty="0" smtClean="0">
+                <a:ln>
+                  <a:solidFill>
+                    <a:schemeClr val="bg1">
+                      <a:lumMod val="75000"/>
+                      <a:lumOff val="25000"/>
+                    </a:schemeClr>
+                  </a:solidFill>
+                </a:ln>
+                <a:solidFill>
+                  <a:schemeClr val="bg1">
+                    <a:lumMod val="75000"/>
+                    <a:lumOff val="25000"/>
+                  </a:schemeClr>
+                </a:solidFill>
+                <a:latin typeface="Arial Unicode MS" pitchFamily="34" charset="-128"/>
+                <a:ea typeface="Arial Unicode MS" pitchFamily="34" charset="-128"/>
+                <a:cs typeface="Arial Unicode MS" pitchFamily="34" charset="-128"/>
+              </a:rPr>
+              <a:t>~ Balance now appears on profile page</a:t>
+            </a:r>
+          </a:p>
+          <a:p>
+            <a:r>
+              <a:rPr lang="en-US" sz="2900" dirty="0" smtClean="0">
+                <a:ln>
+                  <a:solidFill>
+                    <a:schemeClr val="bg1">
+                      <a:lumMod val="75000"/>
+                      <a:lumOff val="25000"/>
+                    </a:schemeClr>
+                  </a:solidFill>
+                </a:ln>
+                <a:solidFill>
+                  <a:schemeClr val="bg1">
+                    <a:lumMod val="75000"/>
+                    <a:lumOff val="25000"/>
+                  </a:schemeClr>
+                </a:solidFill>
+                <a:latin typeface="Arial Unicode MS" pitchFamily="34" charset="-128"/>
+                <a:ea typeface="Arial Unicode MS" pitchFamily="34" charset="-128"/>
+                <a:cs typeface="Arial Unicode MS" pitchFamily="34" charset="-128"/>
+              </a:rPr>
+              <a:t>~ Inefficient funds exception</a:t>
+            </a:r>
+          </a:p>
+          <a:p>
+            <a:r>
+              <a:rPr lang="en-US" sz="2900" dirty="0" smtClean="0">
+                <a:ln>
+                  <a:solidFill>
+                    <a:schemeClr val="bg1">
+                      <a:lumMod val="75000"/>
+                      <a:lumOff val="25000"/>
+                    </a:schemeClr>
+                  </a:solidFill>
+                </a:ln>
+                <a:solidFill>
+                  <a:schemeClr val="bg1">
+                    <a:lumMod val="75000"/>
+                    <a:lumOff val="25000"/>
+                  </a:schemeClr>
+                </a:solidFill>
+                <a:latin typeface="Arial Unicode MS" pitchFamily="34" charset="-128"/>
+                <a:ea typeface="Arial Unicode MS" pitchFamily="34" charset="-128"/>
+                <a:cs typeface="Arial Unicode MS" pitchFamily="34" charset="-128"/>
+              </a:rPr>
+              <a:t>~ </a:t>
+            </a:r>
             <a:r>
               <a:rPr lang="en-US" sz="2900" dirty="0">
                 <a:ln>
@@ -5807,7 +5581,7 @@
                 <a:ea typeface="Arial Unicode MS" pitchFamily="34" charset="-128"/>
                 <a:cs typeface="Arial Unicode MS" pitchFamily="34" charset="-128"/>
               </a:rPr>
-              <a:t> </a:t>
+              <a:t>O</a:t>
             </a:r>
             <a:r>
               <a:rPr lang="en-US" sz="2900" dirty="0" smtClean="0">
@@ -5829,8 +5603,10 @@
                 <a:ea typeface="Arial Unicode MS" pitchFamily="34" charset="-128"/>
                 <a:cs typeface="Arial Unicode MS" pitchFamily="34" charset="-128"/>
               </a:rPr>
-              <a:t>  dynamic </a:t>
-            </a:r>
+              <a:t>rders are now numbered</a:t>
+            </a:r>
+          </a:p>
+          <a:p>
             <a:r>
               <a:rPr lang="en-US" sz="2900" dirty="0" smtClean="0">
                 <a:ln>
@@ -5851,363 +5627,7 @@
                 <a:ea typeface="Arial Unicode MS" pitchFamily="34" charset="-128"/>
                 <a:cs typeface="Arial Unicode MS" pitchFamily="34" charset="-128"/>
               </a:rPr>
-              <a:t>pages</a:t>
-            </a:r>
-            <a:endParaRPr lang="en-US" sz="2900" dirty="0" smtClean="0">
-              <a:ln>
-                <a:solidFill>
-                  <a:schemeClr val="bg1">
-                    <a:lumMod val="75000"/>
-                    <a:lumOff val="25000"/>
-                  </a:schemeClr>
-                </a:solidFill>
-              </a:ln>
-              <a:solidFill>
-                <a:schemeClr val="bg1">
-                  <a:lumMod val="75000"/>
-                  <a:lumOff val="25000"/>
-                </a:schemeClr>
-              </a:solidFill>
-              <a:latin typeface="Arial Unicode MS" pitchFamily="34" charset="-128"/>
-              <a:ea typeface="Arial Unicode MS" pitchFamily="34" charset="-128"/>
-              <a:cs typeface="Arial Unicode MS" pitchFamily="34" charset="-128"/>
-            </a:endParaRPr>
-          </a:p>
-          <a:p>
-            <a:r>
-              <a:rPr lang="en-US" sz="2900" dirty="0" smtClean="0">
-                <a:ln>
-                  <a:solidFill>
-                    <a:schemeClr val="bg1">
-                      <a:lumMod val="75000"/>
-                      <a:lumOff val="25000"/>
-                    </a:schemeClr>
-                  </a:solidFill>
-                </a:ln>
-                <a:solidFill>
-                  <a:schemeClr val="bg1">
-                    <a:lumMod val="75000"/>
-                    <a:lumOff val="25000"/>
-                  </a:schemeClr>
-                </a:solidFill>
-                <a:latin typeface="Arial Unicode MS" pitchFamily="34" charset="-128"/>
-                <a:ea typeface="Arial Unicode MS" pitchFamily="34" charset="-128"/>
-                <a:cs typeface="Arial Unicode MS" pitchFamily="34" charset="-128"/>
-              </a:rPr>
-              <a:t>~ </a:t>
-            </a:r>
-            <a:r>
-              <a:rPr lang="en-US" sz="2900" dirty="0" smtClean="0">
-                <a:ln>
-                  <a:solidFill>
-                    <a:schemeClr val="bg1">
-                      <a:lumMod val="75000"/>
-                      <a:lumOff val="25000"/>
-                    </a:schemeClr>
-                  </a:solidFill>
-                </a:ln>
-                <a:solidFill>
-                  <a:schemeClr val="bg1">
-                    <a:lumMod val="75000"/>
-                    <a:lumOff val="25000"/>
-                  </a:schemeClr>
-                </a:solidFill>
-                <a:latin typeface="Arial Unicode MS" pitchFamily="34" charset="-128"/>
-                <a:ea typeface="Arial Unicode MS" pitchFamily="34" charset="-128"/>
-                <a:cs typeface="Arial Unicode MS" pitchFamily="34" charset="-128"/>
-              </a:rPr>
-              <a:t>Users can add preferences to orders</a:t>
-            </a:r>
-            <a:endParaRPr lang="en-US" sz="2900" dirty="0" smtClean="0">
-              <a:ln>
-                <a:solidFill>
-                  <a:schemeClr val="bg1">
-                    <a:lumMod val="75000"/>
-                    <a:lumOff val="25000"/>
-                  </a:schemeClr>
-                </a:solidFill>
-              </a:ln>
-              <a:solidFill>
-                <a:schemeClr val="bg1">
-                  <a:lumMod val="75000"/>
-                  <a:lumOff val="25000"/>
-                </a:schemeClr>
-              </a:solidFill>
-              <a:latin typeface="Arial Unicode MS" pitchFamily="34" charset="-128"/>
-              <a:ea typeface="Arial Unicode MS" pitchFamily="34" charset="-128"/>
-              <a:cs typeface="Arial Unicode MS" pitchFamily="34" charset="-128"/>
-            </a:endParaRPr>
-          </a:p>
-          <a:p>
-            <a:r>
-              <a:rPr lang="en-US" sz="2900" dirty="0" smtClean="0">
-                <a:ln>
-                  <a:solidFill>
-                    <a:schemeClr val="bg1">
-                      <a:lumMod val="75000"/>
-                      <a:lumOff val="25000"/>
-                    </a:schemeClr>
-                  </a:solidFill>
-                </a:ln>
-                <a:solidFill>
-                  <a:schemeClr val="bg1">
-                    <a:lumMod val="75000"/>
-                    <a:lumOff val="25000"/>
-                  </a:schemeClr>
-                </a:solidFill>
-                <a:latin typeface="Arial Unicode MS" pitchFamily="34" charset="-128"/>
-                <a:ea typeface="Arial Unicode MS" pitchFamily="34" charset="-128"/>
-                <a:cs typeface="Arial Unicode MS" pitchFamily="34" charset="-128"/>
-              </a:rPr>
-              <a:t>~ </a:t>
-            </a:r>
-            <a:r>
-              <a:rPr lang="en-US" sz="2900" dirty="0" smtClean="0">
-                <a:ln>
-                  <a:solidFill>
-                    <a:schemeClr val="bg1">
-                      <a:lumMod val="75000"/>
-                      <a:lumOff val="25000"/>
-                    </a:schemeClr>
-                  </a:solidFill>
-                </a:ln>
-                <a:solidFill>
-                  <a:schemeClr val="bg1">
-                    <a:lumMod val="75000"/>
-                    <a:lumOff val="25000"/>
-                  </a:schemeClr>
-                </a:solidFill>
-                <a:latin typeface="Arial Unicode MS" pitchFamily="34" charset="-128"/>
-                <a:ea typeface="Arial Unicode MS" pitchFamily="34" charset="-128"/>
-                <a:cs typeface="Arial Unicode MS" pitchFamily="34" charset="-128"/>
-              </a:rPr>
-              <a:t>Balance now </a:t>
-            </a:r>
-            <a:r>
-              <a:rPr lang="en-US" sz="2900" dirty="0" smtClean="0">
-                <a:ln>
-                  <a:solidFill>
-                    <a:schemeClr val="bg1">
-                      <a:lumMod val="75000"/>
-                      <a:lumOff val="25000"/>
-                    </a:schemeClr>
-                  </a:solidFill>
-                </a:ln>
-                <a:solidFill>
-                  <a:schemeClr val="bg1">
-                    <a:lumMod val="75000"/>
-                    <a:lumOff val="25000"/>
-                  </a:schemeClr>
-                </a:solidFill>
-                <a:latin typeface="Arial Unicode MS" pitchFamily="34" charset="-128"/>
-                <a:ea typeface="Arial Unicode MS" pitchFamily="34" charset="-128"/>
-                <a:cs typeface="Arial Unicode MS" pitchFamily="34" charset="-128"/>
-              </a:rPr>
-              <a:t>appears on </a:t>
-            </a:r>
-            <a:r>
-              <a:rPr lang="en-US" sz="2900" dirty="0" smtClean="0">
-                <a:ln>
-                  <a:solidFill>
-                    <a:schemeClr val="bg1">
-                      <a:lumMod val="75000"/>
-                      <a:lumOff val="25000"/>
-                    </a:schemeClr>
-                  </a:solidFill>
-                </a:ln>
-                <a:solidFill>
-                  <a:schemeClr val="bg1">
-                    <a:lumMod val="75000"/>
-                    <a:lumOff val="25000"/>
-                  </a:schemeClr>
-                </a:solidFill>
-                <a:latin typeface="Arial Unicode MS" pitchFamily="34" charset="-128"/>
-                <a:ea typeface="Arial Unicode MS" pitchFamily="34" charset="-128"/>
-                <a:cs typeface="Arial Unicode MS" pitchFamily="34" charset="-128"/>
-              </a:rPr>
-              <a:t>profile </a:t>
-            </a:r>
-            <a:r>
-              <a:rPr lang="en-US" sz="2900" dirty="0" smtClean="0">
-                <a:ln>
-                  <a:solidFill>
-                    <a:schemeClr val="bg1">
-                      <a:lumMod val="75000"/>
-                      <a:lumOff val="25000"/>
-                    </a:schemeClr>
-                  </a:solidFill>
-                </a:ln>
-                <a:solidFill>
-                  <a:schemeClr val="bg1">
-                    <a:lumMod val="75000"/>
-                    <a:lumOff val="25000"/>
-                  </a:schemeClr>
-                </a:solidFill>
-                <a:latin typeface="Arial Unicode MS" pitchFamily="34" charset="-128"/>
-                <a:ea typeface="Arial Unicode MS" pitchFamily="34" charset="-128"/>
-                <a:cs typeface="Arial Unicode MS" pitchFamily="34" charset="-128"/>
-              </a:rPr>
-              <a:t>page</a:t>
-            </a:r>
-          </a:p>
-          <a:p>
-            <a:r>
-              <a:rPr lang="en-US" sz="2900" dirty="0" smtClean="0">
-                <a:ln>
-                  <a:solidFill>
-                    <a:schemeClr val="bg1">
-                      <a:lumMod val="75000"/>
-                      <a:lumOff val="25000"/>
-                    </a:schemeClr>
-                  </a:solidFill>
-                </a:ln>
-                <a:solidFill>
-                  <a:schemeClr val="bg1">
-                    <a:lumMod val="75000"/>
-                    <a:lumOff val="25000"/>
-                  </a:schemeClr>
-                </a:solidFill>
-                <a:latin typeface="Arial Unicode MS" pitchFamily="34" charset="-128"/>
-                <a:ea typeface="Arial Unicode MS" pitchFamily="34" charset="-128"/>
-                <a:cs typeface="Arial Unicode MS" pitchFamily="34" charset="-128"/>
-              </a:rPr>
-              <a:t>~ Inefficient funds exception</a:t>
-            </a:r>
-          </a:p>
-          <a:p>
-            <a:r>
-              <a:rPr lang="en-US" sz="2900" dirty="0" smtClean="0">
-                <a:ln>
-                  <a:solidFill>
-                    <a:schemeClr val="bg1">
-                      <a:lumMod val="75000"/>
-                      <a:lumOff val="25000"/>
-                    </a:schemeClr>
-                  </a:solidFill>
-                </a:ln>
-                <a:solidFill>
-                  <a:schemeClr val="bg1">
-                    <a:lumMod val="75000"/>
-                    <a:lumOff val="25000"/>
-                  </a:schemeClr>
-                </a:solidFill>
-                <a:latin typeface="Arial Unicode MS" pitchFamily="34" charset="-128"/>
-                <a:ea typeface="Arial Unicode MS" pitchFamily="34" charset="-128"/>
-                <a:cs typeface="Arial Unicode MS" pitchFamily="34" charset="-128"/>
-              </a:rPr>
-              <a:t>~ </a:t>
-            </a:r>
-            <a:r>
-              <a:rPr lang="en-US" sz="2900" dirty="0">
-                <a:ln>
-                  <a:solidFill>
-                    <a:schemeClr val="bg1">
-                      <a:lumMod val="75000"/>
-                      <a:lumOff val="25000"/>
-                    </a:schemeClr>
-                  </a:solidFill>
-                </a:ln>
-                <a:solidFill>
-                  <a:schemeClr val="bg1">
-                    <a:lumMod val="75000"/>
-                    <a:lumOff val="25000"/>
-                  </a:schemeClr>
-                </a:solidFill>
-                <a:latin typeface="Arial Unicode MS" pitchFamily="34" charset="-128"/>
-                <a:ea typeface="Arial Unicode MS" pitchFamily="34" charset="-128"/>
-                <a:cs typeface="Arial Unicode MS" pitchFamily="34" charset="-128"/>
-              </a:rPr>
-              <a:t>O</a:t>
-            </a:r>
-            <a:r>
-              <a:rPr lang="en-US" sz="2900" dirty="0" smtClean="0">
-                <a:ln>
-                  <a:solidFill>
-                    <a:schemeClr val="bg1">
-                      <a:lumMod val="75000"/>
-                      <a:lumOff val="25000"/>
-                    </a:schemeClr>
-                  </a:solidFill>
-                </a:ln>
-                <a:solidFill>
-                  <a:schemeClr val="bg1">
-                    <a:lumMod val="75000"/>
-                    <a:lumOff val="25000"/>
-                  </a:schemeClr>
-                </a:solidFill>
-                <a:latin typeface="Arial Unicode MS" pitchFamily="34" charset="-128"/>
-                <a:ea typeface="Arial Unicode MS" pitchFamily="34" charset="-128"/>
-                <a:cs typeface="Arial Unicode MS" pitchFamily="34" charset="-128"/>
-              </a:rPr>
-              <a:t>rders are now numbered</a:t>
-            </a:r>
-          </a:p>
-          <a:p>
-            <a:r>
-              <a:rPr lang="en-US" sz="2900" dirty="0" smtClean="0">
-                <a:ln>
-                  <a:solidFill>
-                    <a:schemeClr val="bg1">
-                      <a:lumMod val="75000"/>
-                      <a:lumOff val="25000"/>
-                    </a:schemeClr>
-                  </a:solidFill>
-                </a:ln>
-                <a:solidFill>
-                  <a:schemeClr val="bg1">
-                    <a:lumMod val="75000"/>
-                    <a:lumOff val="25000"/>
-                  </a:schemeClr>
-                </a:solidFill>
-                <a:latin typeface="Arial Unicode MS" pitchFamily="34" charset="-128"/>
-                <a:ea typeface="Arial Unicode MS" pitchFamily="34" charset="-128"/>
-                <a:cs typeface="Arial Unicode MS" pitchFamily="34" charset="-128"/>
-              </a:rPr>
-              <a:t>~ For screen </a:t>
-            </a:r>
-            <a:r>
-              <a:rPr lang="en-US" sz="2900" dirty="0" smtClean="0">
-                <a:ln>
-                  <a:solidFill>
-                    <a:schemeClr val="bg1">
-                      <a:lumMod val="75000"/>
-                      <a:lumOff val="25000"/>
-                    </a:schemeClr>
-                  </a:solidFill>
-                </a:ln>
-                <a:solidFill>
-                  <a:schemeClr val="bg1">
-                    <a:lumMod val="75000"/>
-                    <a:lumOff val="25000"/>
-                  </a:schemeClr>
-                </a:solidFill>
-                <a:latin typeface="Arial Unicode MS" pitchFamily="34" charset="-128"/>
-                <a:ea typeface="Arial Unicode MS" pitchFamily="34" charset="-128"/>
-                <a:cs typeface="Arial Unicode MS" pitchFamily="34" charset="-128"/>
-              </a:rPr>
-              <a:t>utilization, the </a:t>
-            </a:r>
-            <a:r>
-              <a:rPr lang="en-US" sz="2900" dirty="0" smtClean="0">
-                <a:ln>
-                  <a:solidFill>
-                    <a:schemeClr val="bg1">
-                      <a:lumMod val="75000"/>
-                      <a:lumOff val="25000"/>
-                    </a:schemeClr>
-                  </a:solidFill>
-                </a:ln>
-                <a:solidFill>
-                  <a:schemeClr val="bg1">
-                    <a:lumMod val="75000"/>
-                    <a:lumOff val="25000"/>
-                  </a:schemeClr>
-                </a:solidFill>
-                <a:latin typeface="Arial Unicode MS" pitchFamily="34" charset="-128"/>
-                <a:ea typeface="Arial Unicode MS" pitchFamily="34" charset="-128"/>
-                <a:cs typeface="Arial Unicode MS" pitchFamily="34" charset="-128"/>
-              </a:rPr>
-              <a:t>menu bar will become </a:t>
+              <a:t>~ For screen utilization, the menu bar will become </a:t>
             </a:r>
           </a:p>
           <a:p>
@@ -6680,29 +6100,7 @@
                 <a:ea typeface="Arial Unicode MS" pitchFamily="34" charset="-128"/>
                 <a:cs typeface="Arial Unicode MS" pitchFamily="34" charset="-128"/>
               </a:rPr>
-              <a:t>- </a:t>
-            </a:r>
-            <a:r>
-              <a:rPr lang="en-US" sz="3600" smtClean="0">
-                <a:ln>
-                  <a:solidFill>
-                    <a:schemeClr val="bg1">
-                      <a:lumMod val="75000"/>
-                      <a:lumOff val="25000"/>
-                    </a:schemeClr>
-                  </a:solidFill>
-                </a:ln>
-                <a:solidFill>
-                  <a:schemeClr val="bg1">
-                    <a:lumMod val="75000"/>
-                    <a:lumOff val="25000"/>
-                  </a:schemeClr>
-                </a:solidFill>
-                <a:latin typeface="Arial Unicode MS" pitchFamily="34" charset="-128"/>
-                <a:ea typeface="Arial Unicode MS" pitchFamily="34" charset="-128"/>
-                <a:cs typeface="Arial Unicode MS" pitchFamily="34" charset="-128"/>
-              </a:rPr>
-              <a:t>Gather </a:t>
+              <a:t>- Gather </a:t>
             </a:r>
             <a:r>
               <a:rPr lang="en-US" sz="3600" dirty="0" smtClean="0">
@@ -6748,7 +6146,31 @@
                 <a:ea typeface="Arial Unicode MS" pitchFamily="34" charset="-128"/>
                 <a:cs typeface="Arial Unicode MS" pitchFamily="34" charset="-128"/>
               </a:rPr>
-              <a:t>	  (security and </a:t>
+              <a:t>	  (security and auditability)</a:t>
+            </a:r>
+          </a:p>
+          <a:p>
+            <a:r>
+              <a:rPr lang="en-US" sz="3600" dirty="0">
+                <a:ln>
+                  <a:solidFill>
+                    <a:schemeClr val="bg1">
+                      <a:lumMod val="75000"/>
+                      <a:lumOff val="25000"/>
+                    </a:schemeClr>
+                  </a:solidFill>
+                </a:ln>
+                <a:solidFill>
+                  <a:schemeClr val="bg1">
+                    <a:lumMod val="75000"/>
+                    <a:lumOff val="25000"/>
+                  </a:schemeClr>
+                </a:solidFill>
+                <a:latin typeface="Arial Unicode MS" pitchFamily="34" charset="-128"/>
+                <a:ea typeface="Arial Unicode MS" pitchFamily="34" charset="-128"/>
+                <a:cs typeface="Arial Unicode MS" pitchFamily="34" charset="-128"/>
+              </a:rPr>
+              <a:t>	</a:t>
             </a:r>
             <a:r>
               <a:rPr lang="en-US" sz="3600" dirty="0" smtClean="0">
@@ -6770,27 +6192,8 @@
                 <a:ea typeface="Arial Unicode MS" pitchFamily="34" charset="-128"/>
                 <a:cs typeface="Arial Unicode MS" pitchFamily="34" charset="-128"/>
               </a:rPr>
-              <a:t>auditability)</a:t>
-            </a:r>
-            <a:endParaRPr lang="en-US" sz="3600" dirty="0" smtClean="0">
-              <a:ln>
-                <a:solidFill>
-                  <a:schemeClr val="bg1">
-                    <a:lumMod val="75000"/>
-                    <a:lumOff val="25000"/>
-                  </a:schemeClr>
-                </a:solidFill>
-              </a:ln>
-              <a:solidFill>
-                <a:schemeClr val="bg1">
-                  <a:lumMod val="75000"/>
-                  <a:lumOff val="25000"/>
-                </a:schemeClr>
-              </a:solidFill>
-              <a:latin typeface="Arial Unicode MS" pitchFamily="34" charset="-128"/>
-              <a:ea typeface="Arial Unicode MS" pitchFamily="34" charset="-128"/>
-              <a:cs typeface="Arial Unicode MS" pitchFamily="34" charset="-128"/>
-            </a:endParaRPr>
+              <a:t>- Use history data to create </a:t>
+            </a:r>
           </a:p>
           <a:p>
             <a:r>
@@ -6835,32 +6238,10 @@
                 <a:ea typeface="Arial Unicode MS" pitchFamily="34" charset="-128"/>
                 <a:cs typeface="Arial Unicode MS" pitchFamily="34" charset="-128"/>
               </a:rPr>
-              <a:t>- Use history data to create </a:t>
-            </a:r>
-          </a:p>
-          <a:p>
-            <a:r>
-              <a:rPr lang="en-US" sz="3600" dirty="0">
-                <a:ln>
-                  <a:solidFill>
-                    <a:schemeClr val="bg1">
-                      <a:lumMod val="75000"/>
-                      <a:lumOff val="25000"/>
-                    </a:schemeClr>
-                  </a:solidFill>
-                </a:ln>
-                <a:solidFill>
-                  <a:schemeClr val="bg1">
-                    <a:lumMod val="75000"/>
-                    <a:lumOff val="25000"/>
-                  </a:schemeClr>
-                </a:solidFill>
-                <a:latin typeface="Arial Unicode MS" pitchFamily="34" charset="-128"/>
-                <a:ea typeface="Arial Unicode MS" pitchFamily="34" charset="-128"/>
-                <a:cs typeface="Arial Unicode MS" pitchFamily="34" charset="-128"/>
-              </a:rPr>
-              <a:t>	</a:t>
-            </a:r>
+              <a:t>  usage graphs </a:t>
+            </a:r>
+          </a:p>
+          <a:p>
             <a:r>
               <a:rPr lang="en-US" sz="3600" dirty="0" smtClean="0">
                 <a:ln>
@@ -6881,75 +6262,7 @@
                 <a:ea typeface="Arial Unicode MS" pitchFamily="34" charset="-128"/>
                 <a:cs typeface="Arial Unicode MS" pitchFamily="34" charset="-128"/>
               </a:rPr>
-              <a:t>  usage </a:t>
-            </a:r>
-            <a:r>
-              <a:rPr lang="en-US" sz="3600" dirty="0" smtClean="0">
-                <a:ln>
-                  <a:solidFill>
-                    <a:schemeClr val="bg1">
-                      <a:lumMod val="75000"/>
-                      <a:lumOff val="25000"/>
-                    </a:schemeClr>
-                  </a:solidFill>
-                </a:ln>
-                <a:solidFill>
-                  <a:schemeClr val="bg1">
-                    <a:lumMod val="75000"/>
-                    <a:lumOff val="25000"/>
-                  </a:schemeClr>
-                </a:solidFill>
-                <a:latin typeface="Arial Unicode MS" pitchFamily="34" charset="-128"/>
-                <a:ea typeface="Arial Unicode MS" pitchFamily="34" charset="-128"/>
-                <a:cs typeface="Arial Unicode MS" pitchFamily="34" charset="-128"/>
-              </a:rPr>
-              <a:t>graphs </a:t>
-            </a:r>
-          </a:p>
-          <a:p>
-            <a:r>
-              <a:rPr lang="en-US" sz="3600" dirty="0" smtClean="0">
-                <a:ln>
-                  <a:solidFill>
-                    <a:schemeClr val="bg1">
-                      <a:lumMod val="75000"/>
-                      <a:lumOff val="25000"/>
-                    </a:schemeClr>
-                  </a:solidFill>
-                </a:ln>
-                <a:solidFill>
-                  <a:schemeClr val="bg1">
-                    <a:lumMod val="75000"/>
-                    <a:lumOff val="25000"/>
-                  </a:schemeClr>
-                </a:solidFill>
-                <a:latin typeface="Arial Unicode MS" pitchFamily="34" charset="-128"/>
-                <a:ea typeface="Arial Unicode MS" pitchFamily="34" charset="-128"/>
-                <a:cs typeface="Arial Unicode MS" pitchFamily="34" charset="-128"/>
-              </a:rPr>
-              <a:t>~ </a:t>
-            </a:r>
-            <a:r>
-              <a:rPr lang="en-US" sz="3600" dirty="0" smtClean="0">
-                <a:ln>
-                  <a:solidFill>
-                    <a:schemeClr val="bg1">
-                      <a:lumMod val="75000"/>
-                      <a:lumOff val="25000"/>
-                    </a:schemeClr>
-                  </a:solidFill>
-                </a:ln>
-                <a:solidFill>
-                  <a:schemeClr val="bg1">
-                    <a:lumMod val="75000"/>
-                    <a:lumOff val="25000"/>
-                  </a:schemeClr>
-                </a:solidFill>
-                <a:latin typeface="Arial Unicode MS" pitchFamily="34" charset="-128"/>
-                <a:ea typeface="Arial Unicode MS" pitchFamily="34" charset="-128"/>
-                <a:cs typeface="Arial Unicode MS" pitchFamily="34" charset="-128"/>
-              </a:rPr>
-              <a:t>Usability testing</a:t>
+              <a:t>~ Usability testing</a:t>
             </a:r>
           </a:p>
           <a:p>
@@ -7199,8 +6512,10 @@
                 <a:ea typeface="Arial Unicode MS" pitchFamily="34" charset="-128"/>
                 <a:cs typeface="Arial Unicode MS" pitchFamily="34" charset="-128"/>
               </a:rPr>
-              <a:t>~ Phase 5 </a:t>
-            </a:r>
+              <a:t>~ Phase 5 –Tying everything up</a:t>
+            </a:r>
+          </a:p>
+          <a:p>
             <a:r>
               <a:rPr lang="en-US" sz="3600" dirty="0" smtClean="0">
                 <a:ln>
@@ -7221,7 +6536,7 @@
                 <a:ea typeface="Arial Unicode MS" pitchFamily="34" charset="-128"/>
                 <a:cs typeface="Arial Unicode MS" pitchFamily="34" charset="-128"/>
               </a:rPr>
-              <a:t>–Tying everything up</a:t>
+              <a:t>~ This phase will consist of fixing the last</a:t>
             </a:r>
           </a:p>
           <a:p>
@@ -7245,97 +6560,7 @@
                 <a:ea typeface="Arial Unicode MS" pitchFamily="34" charset="-128"/>
                 <a:cs typeface="Arial Unicode MS" pitchFamily="34" charset="-128"/>
               </a:rPr>
-              <a:t>~ </a:t>
-            </a:r>
-            <a:r>
-              <a:rPr lang="en-US" sz="3600" dirty="0" smtClean="0">
-                <a:ln>
-                  <a:solidFill>
-                    <a:schemeClr val="bg1">
-                      <a:lumMod val="75000"/>
-                      <a:lumOff val="25000"/>
-                    </a:schemeClr>
-                  </a:solidFill>
-                </a:ln>
-                <a:solidFill>
-                  <a:schemeClr val="bg1">
-                    <a:lumMod val="75000"/>
-                    <a:lumOff val="25000"/>
-                  </a:schemeClr>
-                </a:solidFill>
-                <a:latin typeface="Arial Unicode MS" pitchFamily="34" charset="-128"/>
-                <a:ea typeface="Arial Unicode MS" pitchFamily="34" charset="-128"/>
-                <a:cs typeface="Arial Unicode MS" pitchFamily="34" charset="-128"/>
-              </a:rPr>
-              <a:t>This phase will consist of fixing the last</a:t>
-            </a:r>
-          </a:p>
-          <a:p>
-            <a:r>
-              <a:rPr lang="en-US" sz="3600" dirty="0" smtClean="0">
-                <a:ln>
-                  <a:solidFill>
-                    <a:schemeClr val="bg1">
-                      <a:lumMod val="75000"/>
-                      <a:lumOff val="25000"/>
-                    </a:schemeClr>
-                  </a:solidFill>
-                </a:ln>
-                <a:solidFill>
-                  <a:schemeClr val="bg1">
-                    <a:lumMod val="75000"/>
-                    <a:lumOff val="25000"/>
-                  </a:schemeClr>
-                </a:solidFill>
-                <a:latin typeface="Arial Unicode MS" pitchFamily="34" charset="-128"/>
-                <a:ea typeface="Arial Unicode MS" pitchFamily="34" charset="-128"/>
-                <a:cs typeface="Arial Unicode MS" pitchFamily="34" charset="-128"/>
-              </a:rPr>
-              <a:t>    few things of </a:t>
-            </a:r>
-            <a:r>
-              <a:rPr lang="en-US" sz="3600" dirty="0" smtClean="0">
-                <a:ln>
-                  <a:solidFill>
-                    <a:schemeClr val="bg1">
-                      <a:lumMod val="75000"/>
-                      <a:lumOff val="25000"/>
-                    </a:schemeClr>
-                  </a:solidFill>
-                </a:ln>
-                <a:solidFill>
-                  <a:schemeClr val="bg1">
-                    <a:lumMod val="75000"/>
-                    <a:lumOff val="25000"/>
-                  </a:schemeClr>
-                </a:solidFill>
-                <a:latin typeface="Arial Unicode MS" pitchFamily="34" charset="-128"/>
-                <a:ea typeface="Arial Unicode MS" pitchFamily="34" charset="-128"/>
-                <a:cs typeface="Arial Unicode MS" pitchFamily="34" charset="-128"/>
-              </a:rPr>
-              <a:t>the core </a:t>
-            </a:r>
-            <a:r>
-              <a:rPr lang="en-US" sz="3600" dirty="0" smtClean="0">
-                <a:ln>
-                  <a:solidFill>
-                    <a:schemeClr val="bg1">
-                      <a:lumMod val="75000"/>
-                      <a:lumOff val="25000"/>
-                    </a:schemeClr>
-                  </a:solidFill>
-                </a:ln>
-                <a:solidFill>
-                  <a:schemeClr val="bg1">
-                    <a:lumMod val="75000"/>
-                    <a:lumOff val="25000"/>
-                  </a:schemeClr>
-                </a:solidFill>
-                <a:latin typeface="Arial Unicode MS" pitchFamily="34" charset="-128"/>
-                <a:ea typeface="Arial Unicode MS" pitchFamily="34" charset="-128"/>
-                <a:cs typeface="Arial Unicode MS" pitchFamily="34" charset="-128"/>
-              </a:rPr>
-              <a:t>requirements </a:t>
+              <a:t>    few things of the core requirements </a:t>
             </a:r>
           </a:p>
         </p:txBody>

</xml_diff>